<commit_message>
added tunneling matlab to skills page
</commit_message>
<xml_diff>
--- a/images/IMAGES.pptx
+++ b/images/IMAGES.pptx
@@ -246,7 +246,7 @@
           <a:p>
             <a:fld id="{528D9DF0-8E21-427B-ABE8-5F59536DBF6A}" type="datetimeFigureOut">
               <a:rPr lang="en-US" smtClean="0"/>
-              <a:t>10/17/2015</a:t>
+              <a:t>10/24/2015</a:t>
             </a:fld>
             <a:endParaRPr lang="en-US"/>
           </a:p>
@@ -416,7 +416,7 @@
           <a:p>
             <a:fld id="{528D9DF0-8E21-427B-ABE8-5F59536DBF6A}" type="datetimeFigureOut">
               <a:rPr lang="en-US" smtClean="0"/>
-              <a:t>10/17/2015</a:t>
+              <a:t>10/24/2015</a:t>
             </a:fld>
             <a:endParaRPr lang="en-US"/>
           </a:p>
@@ -596,7 +596,7 @@
           <a:p>
             <a:fld id="{528D9DF0-8E21-427B-ABE8-5F59536DBF6A}" type="datetimeFigureOut">
               <a:rPr lang="en-US" smtClean="0"/>
-              <a:t>10/17/2015</a:t>
+              <a:t>10/24/2015</a:t>
             </a:fld>
             <a:endParaRPr lang="en-US"/>
           </a:p>
@@ -766,7 +766,7 @@
           <a:p>
             <a:fld id="{528D9DF0-8E21-427B-ABE8-5F59536DBF6A}" type="datetimeFigureOut">
               <a:rPr lang="en-US" smtClean="0"/>
-              <a:t>10/17/2015</a:t>
+              <a:t>10/24/2015</a:t>
             </a:fld>
             <a:endParaRPr lang="en-US"/>
           </a:p>
@@ -1012,7 +1012,7 @@
           <a:p>
             <a:fld id="{528D9DF0-8E21-427B-ABE8-5F59536DBF6A}" type="datetimeFigureOut">
               <a:rPr lang="en-US" smtClean="0"/>
-              <a:t>10/17/2015</a:t>
+              <a:t>10/24/2015</a:t>
             </a:fld>
             <a:endParaRPr lang="en-US"/>
           </a:p>
@@ -1244,7 +1244,7 @@
           <a:p>
             <a:fld id="{528D9DF0-8E21-427B-ABE8-5F59536DBF6A}" type="datetimeFigureOut">
               <a:rPr lang="en-US" smtClean="0"/>
-              <a:t>10/17/2015</a:t>
+              <a:t>10/24/2015</a:t>
             </a:fld>
             <a:endParaRPr lang="en-US"/>
           </a:p>
@@ -1611,7 +1611,7 @@
           <a:p>
             <a:fld id="{528D9DF0-8E21-427B-ABE8-5F59536DBF6A}" type="datetimeFigureOut">
               <a:rPr lang="en-US" smtClean="0"/>
-              <a:t>10/17/2015</a:t>
+              <a:t>10/24/2015</a:t>
             </a:fld>
             <a:endParaRPr lang="en-US"/>
           </a:p>
@@ -1729,7 +1729,7 @@
           <a:p>
             <a:fld id="{528D9DF0-8E21-427B-ABE8-5F59536DBF6A}" type="datetimeFigureOut">
               <a:rPr lang="en-US" smtClean="0"/>
-              <a:t>10/17/2015</a:t>
+              <a:t>10/24/2015</a:t>
             </a:fld>
             <a:endParaRPr lang="en-US"/>
           </a:p>
@@ -1824,7 +1824,7 @@
           <a:p>
             <a:fld id="{528D9DF0-8E21-427B-ABE8-5F59536DBF6A}" type="datetimeFigureOut">
               <a:rPr lang="en-US" smtClean="0"/>
-              <a:t>10/17/2015</a:t>
+              <a:t>10/24/2015</a:t>
             </a:fld>
             <a:endParaRPr lang="en-US"/>
           </a:p>
@@ -2101,7 +2101,7 @@
           <a:p>
             <a:fld id="{528D9DF0-8E21-427B-ABE8-5F59536DBF6A}" type="datetimeFigureOut">
               <a:rPr lang="en-US" smtClean="0"/>
-              <a:t>10/17/2015</a:t>
+              <a:t>10/24/2015</a:t>
             </a:fld>
             <a:endParaRPr lang="en-US"/>
           </a:p>
@@ -2354,7 +2354,7 @@
           <a:p>
             <a:fld id="{528D9DF0-8E21-427B-ABE8-5F59536DBF6A}" type="datetimeFigureOut">
               <a:rPr lang="en-US" smtClean="0"/>
-              <a:t>10/17/2015</a:t>
+              <a:t>10/24/2015</a:t>
             </a:fld>
             <a:endParaRPr lang="en-US"/>
           </a:p>
@@ -2567,7 +2567,7 @@
           <a:p>
             <a:fld id="{528D9DF0-8E21-427B-ABE8-5F59536DBF6A}" type="datetimeFigureOut">
               <a:rPr lang="en-US" smtClean="0"/>
-              <a:t>10/17/2015</a:t>
+              <a:t>10/24/2015</a:t>
             </a:fld>
             <a:endParaRPr lang="en-US"/>
           </a:p>
@@ -3186,7 +3186,7 @@
           <a:effectLst/>
           <a:extLst>
             <a:ext uri="{FAA26D3D-D897-4be2-8F04-BA451C77F1D7}">
-              <ma14:placeholderFlag xmlns="" xmlns:ma14="http://schemas.microsoft.com/office/mac/drawingml/2011/main"/>
+              <ma14:placeholderFlag xmlns:ma14="http://schemas.microsoft.com/office/mac/drawingml/2011/main" xmlns=""/>
             </a:ext>
           </a:extLst>
         </p:spPr>
@@ -4186,6 +4186,185 @@
           <a:chExt cx="0" cy="0"/>
         </a:xfrm>
       </p:grpSpPr>
+      <p:grpSp>
+        <p:nvGrpSpPr>
+          <p:cNvPr id="9" name="Group 8"/>
+          <p:cNvGrpSpPr/>
+          <p:nvPr/>
+        </p:nvGrpSpPr>
+        <p:grpSpPr>
+          <a:xfrm>
+            <a:off x="5328797" y="1714412"/>
+            <a:ext cx="6702881" cy="5070828"/>
+            <a:chOff x="5328797" y="1714412"/>
+            <a:chExt cx="6702881" cy="5070828"/>
+          </a:xfrm>
+        </p:grpSpPr>
+        <p:pic>
+          <p:nvPicPr>
+            <p:cNvPr id="2" name="Picture 1"/>
+            <p:cNvPicPr>
+              <a:picLocks noChangeAspect="1"/>
+            </p:cNvPicPr>
+            <p:nvPr/>
+          </p:nvPicPr>
+          <p:blipFill rotWithShape="1">
+            <a:blip r:embed="rId2"/>
+            <a:srcRect r="67487" b="55727"/>
+            <a:stretch/>
+          </p:blipFill>
+          <p:spPr>
+            <a:xfrm>
+              <a:off x="5408647" y="1714412"/>
+              <a:ext cx="1811625" cy="725326"/>
+            </a:xfrm>
+            <a:prstGeom prst="rect">
+              <a:avLst/>
+            </a:prstGeom>
+          </p:spPr>
+        </p:pic>
+        <p:pic>
+          <p:nvPicPr>
+            <p:cNvPr id="3" name="Picture 2"/>
+            <p:cNvPicPr>
+              <a:picLocks noChangeAspect="1"/>
+            </p:cNvPicPr>
+            <p:nvPr/>
+          </p:nvPicPr>
+          <p:blipFill rotWithShape="1">
+            <a:blip r:embed="rId2"/>
+            <a:srcRect l="16682" t="50311" r="1100"/>
+            <a:stretch/>
+          </p:blipFill>
+          <p:spPr>
+            <a:xfrm>
+              <a:off x="7269488" y="1751356"/>
+              <a:ext cx="4581234" cy="814050"/>
+            </a:xfrm>
+            <a:prstGeom prst="rect">
+              <a:avLst/>
+            </a:prstGeom>
+          </p:spPr>
+        </p:pic>
+        <p:pic>
+          <p:nvPicPr>
+            <p:cNvPr id="6" name="Picture 5"/>
+            <p:cNvPicPr>
+              <a:picLocks noChangeAspect="1"/>
+            </p:cNvPicPr>
+            <p:nvPr/>
+          </p:nvPicPr>
+          <p:blipFill rotWithShape="1">
+            <a:blip r:embed="rId3">
+              <a:extLst>
+                <a:ext uri="{28A0092B-C50C-407E-A947-70E740481C1C}">
+                  <a14:useLocalDpi xmlns:a14="http://schemas.microsoft.com/office/drawing/2010/main" val="0"/>
+                </a:ext>
+              </a:extLst>
+            </a:blip>
+            <a:srcRect l="8571" t="2752" r="8622" b="4837"/>
+            <a:stretch/>
+          </p:blipFill>
+          <p:spPr>
+            <a:xfrm>
+              <a:off x="5328797" y="2938208"/>
+              <a:ext cx="6702881" cy="3847032"/>
+            </a:xfrm>
+            <a:prstGeom prst="rect">
+              <a:avLst/>
+            </a:prstGeom>
+          </p:spPr>
+        </p:pic>
+        <p:pic>
+          <p:nvPicPr>
+            <p:cNvPr id="7" name="Picture 6"/>
+            <p:cNvPicPr>
+              <a:picLocks noChangeAspect="1"/>
+            </p:cNvPicPr>
+            <p:nvPr/>
+          </p:nvPicPr>
+          <p:blipFill>
+            <a:blip r:embed="rId4"/>
+            <a:stretch>
+              <a:fillRect/>
+            </a:stretch>
+          </p:blipFill>
+          <p:spPr>
+            <a:xfrm>
+              <a:off x="8027349" y="3262283"/>
+              <a:ext cx="2305050" cy="895350"/>
+            </a:xfrm>
+            <a:prstGeom prst="rect">
+              <a:avLst/>
+            </a:prstGeom>
+          </p:spPr>
+        </p:pic>
+        <p:sp>
+          <p:nvSpPr>
+            <p:cNvPr id="8" name="TextBox 7"/>
+            <p:cNvSpPr txBox="1"/>
+            <p:nvPr/>
+          </p:nvSpPr>
+          <p:spPr>
+            <a:xfrm>
+              <a:off x="5890528" y="3205610"/>
+              <a:ext cx="2098973" cy="1077218"/>
+            </a:xfrm>
+            <a:prstGeom prst="rect">
+              <a:avLst/>
+            </a:prstGeom>
+            <a:solidFill>
+              <a:schemeClr val="bg1"/>
+            </a:solidFill>
+          </p:spPr>
+          <p:txBody>
+            <a:bodyPr wrap="none" rtlCol="0">
+              <a:spAutoFit/>
+            </a:bodyPr>
+            <a:lstStyle/>
+            <a:p>
+              <a:r>
+                <a:rPr lang="en-US" sz="1600" dirty="0" smtClean="0"/>
+                <a:t>Fitted Gap Parameters:</a:t>
+              </a:r>
+            </a:p>
+            <a:p>
+              <a:r>
+                <a:rPr lang="en-US" sz="1600" dirty="0" smtClean="0"/>
+                <a:t>d = 0.52 nm</a:t>
+              </a:r>
+            </a:p>
+            <a:p>
+              <a:r>
+                <a:rPr lang="en-US" sz="1600" dirty="0" smtClean="0"/>
+                <a:t>Φ</a:t>
+              </a:r>
+              <a:r>
+                <a:rPr lang="en-US" sz="1600" baseline="-25000" dirty="0" smtClean="0"/>
+                <a:t>S</a:t>
+              </a:r>
+              <a:r>
+                <a:rPr lang="en-US" sz="1600" dirty="0" smtClean="0"/>
+                <a:t> = 0.45 eV</a:t>
+              </a:r>
+            </a:p>
+            <a:p>
+              <a:r>
+                <a:rPr lang="en-US" sz="1600" dirty="0" smtClean="0"/>
+                <a:t>Φ</a:t>
+              </a:r>
+              <a:r>
+                <a:rPr lang="en-US" sz="1600" baseline="-25000" dirty="0" smtClean="0"/>
+                <a:t>D</a:t>
+              </a:r>
+              <a:r>
+                <a:rPr lang="en-US" sz="1600" dirty="0" smtClean="0"/>
+                <a:t>= 0.23 eV</a:t>
+              </a:r>
+            </a:p>
+          </p:txBody>
+        </p:sp>
+      </p:grpSp>
     </p:spTree>
     <p:extLst>
       <p:ext uri="{BB962C8B-B14F-4D97-AF65-F5344CB8AC3E}">

</xml_diff>

<commit_message>
updated resume and projects page to show BGG buddy finder app.
</commit_message>
<xml_diff>
--- a/images/IMAGES.pptx
+++ b/images/IMAGES.pptx
@@ -9,6 +9,7 @@
     <p:sldId id="257" r:id="rId3"/>
     <p:sldId id="258" r:id="rId4"/>
     <p:sldId id="259" r:id="rId5"/>
+    <p:sldId id="260" r:id="rId6"/>
   </p:sldIdLst>
   <p:sldSz cx="12192000" cy="6858000"/>
   <p:notesSz cx="6858000" cy="9144000"/>
@@ -246,7 +247,7 @@
           <a:p>
             <a:fld id="{528D9DF0-8E21-427B-ABE8-5F59536DBF6A}" type="datetimeFigureOut">
               <a:rPr lang="en-US" smtClean="0"/>
-              <a:t>10/24/2015</a:t>
+              <a:t>1/29/2017</a:t>
             </a:fld>
             <a:endParaRPr lang="en-US"/>
           </a:p>
@@ -416,7 +417,7 @@
           <a:p>
             <a:fld id="{528D9DF0-8E21-427B-ABE8-5F59536DBF6A}" type="datetimeFigureOut">
               <a:rPr lang="en-US" smtClean="0"/>
-              <a:t>10/24/2015</a:t>
+              <a:t>1/29/2017</a:t>
             </a:fld>
             <a:endParaRPr lang="en-US"/>
           </a:p>
@@ -596,7 +597,7 @@
           <a:p>
             <a:fld id="{528D9DF0-8E21-427B-ABE8-5F59536DBF6A}" type="datetimeFigureOut">
               <a:rPr lang="en-US" smtClean="0"/>
-              <a:t>10/24/2015</a:t>
+              <a:t>1/29/2017</a:t>
             </a:fld>
             <a:endParaRPr lang="en-US"/>
           </a:p>
@@ -766,7 +767,7 @@
           <a:p>
             <a:fld id="{528D9DF0-8E21-427B-ABE8-5F59536DBF6A}" type="datetimeFigureOut">
               <a:rPr lang="en-US" smtClean="0"/>
-              <a:t>10/24/2015</a:t>
+              <a:t>1/29/2017</a:t>
             </a:fld>
             <a:endParaRPr lang="en-US"/>
           </a:p>
@@ -1012,7 +1013,7 @@
           <a:p>
             <a:fld id="{528D9DF0-8E21-427B-ABE8-5F59536DBF6A}" type="datetimeFigureOut">
               <a:rPr lang="en-US" smtClean="0"/>
-              <a:t>10/24/2015</a:t>
+              <a:t>1/29/2017</a:t>
             </a:fld>
             <a:endParaRPr lang="en-US"/>
           </a:p>
@@ -1244,7 +1245,7 @@
           <a:p>
             <a:fld id="{528D9DF0-8E21-427B-ABE8-5F59536DBF6A}" type="datetimeFigureOut">
               <a:rPr lang="en-US" smtClean="0"/>
-              <a:t>10/24/2015</a:t>
+              <a:t>1/29/2017</a:t>
             </a:fld>
             <a:endParaRPr lang="en-US"/>
           </a:p>
@@ -1611,7 +1612,7 @@
           <a:p>
             <a:fld id="{528D9DF0-8E21-427B-ABE8-5F59536DBF6A}" type="datetimeFigureOut">
               <a:rPr lang="en-US" smtClean="0"/>
-              <a:t>10/24/2015</a:t>
+              <a:t>1/29/2017</a:t>
             </a:fld>
             <a:endParaRPr lang="en-US"/>
           </a:p>
@@ -1729,7 +1730,7 @@
           <a:p>
             <a:fld id="{528D9DF0-8E21-427B-ABE8-5F59536DBF6A}" type="datetimeFigureOut">
               <a:rPr lang="en-US" smtClean="0"/>
-              <a:t>10/24/2015</a:t>
+              <a:t>1/29/2017</a:t>
             </a:fld>
             <a:endParaRPr lang="en-US"/>
           </a:p>
@@ -1824,7 +1825,7 @@
           <a:p>
             <a:fld id="{528D9DF0-8E21-427B-ABE8-5F59536DBF6A}" type="datetimeFigureOut">
               <a:rPr lang="en-US" smtClean="0"/>
-              <a:t>10/24/2015</a:t>
+              <a:t>1/29/2017</a:t>
             </a:fld>
             <a:endParaRPr lang="en-US"/>
           </a:p>
@@ -2101,7 +2102,7 @@
           <a:p>
             <a:fld id="{528D9DF0-8E21-427B-ABE8-5F59536DBF6A}" type="datetimeFigureOut">
               <a:rPr lang="en-US" smtClean="0"/>
-              <a:t>10/24/2015</a:t>
+              <a:t>1/29/2017</a:t>
             </a:fld>
             <a:endParaRPr lang="en-US"/>
           </a:p>
@@ -2354,7 +2355,7 @@
           <a:p>
             <a:fld id="{528D9DF0-8E21-427B-ABE8-5F59536DBF6A}" type="datetimeFigureOut">
               <a:rPr lang="en-US" smtClean="0"/>
-              <a:t>10/24/2015</a:t>
+              <a:t>1/29/2017</a:t>
             </a:fld>
             <a:endParaRPr lang="en-US"/>
           </a:p>
@@ -2567,7 +2568,7 @@
           <a:p>
             <a:fld id="{528D9DF0-8E21-427B-ABE8-5F59536DBF6A}" type="datetimeFigureOut">
               <a:rPr lang="en-US" smtClean="0"/>
-              <a:t>10/24/2015</a:t>
+              <a:t>1/29/2017</a:t>
             </a:fld>
             <a:endParaRPr lang="en-US"/>
           </a:p>
@@ -3186,7 +3187,7 @@
           <a:effectLst/>
           <a:extLst>
             <a:ext uri="{FAA26D3D-D897-4be2-8F04-BA451C77F1D7}">
-              <ma14:placeholderFlag xmlns:ma14="http://schemas.microsoft.com/office/mac/drawingml/2011/main" xmlns=""/>
+              <ma14:placeholderFlag xmlns="" xmlns:ma14="http://schemas.microsoft.com/office/mac/drawingml/2011/main"/>
             </a:ext>
           </a:extLst>
         </p:spPr>
@@ -4369,6 +4370,59 @@
     <p:extLst>
       <p:ext uri="{BB962C8B-B14F-4D97-AF65-F5344CB8AC3E}">
         <p14:creationId xmlns:p14="http://schemas.microsoft.com/office/powerpoint/2010/main" val="3180906429"/>
+      </p:ext>
+    </p:extLst>
+  </p:cSld>
+  <p:clrMapOvr>
+    <a:masterClrMapping/>
+  </p:clrMapOvr>
+</p:sld>
+</file>
+
+<file path=ppt/slides/slide5.xml><?xml version="1.0" encoding="utf-8"?>
+<p:sld xmlns:a="http://schemas.openxmlformats.org/drawingml/2006/main" xmlns:r="http://schemas.openxmlformats.org/officeDocument/2006/relationships" xmlns:p="http://schemas.openxmlformats.org/presentationml/2006/main">
+  <p:cSld>
+    <p:spTree>
+      <p:nvGrpSpPr>
+        <p:cNvPr id="1" name=""/>
+        <p:cNvGrpSpPr/>
+        <p:nvPr/>
+      </p:nvGrpSpPr>
+      <p:grpSpPr>
+        <a:xfrm>
+          <a:off x="0" y="0"/>
+          <a:ext cx="0" cy="0"/>
+          <a:chOff x="0" y="0"/>
+          <a:chExt cx="0" cy="0"/>
+        </a:xfrm>
+      </p:grpSpPr>
+      <p:pic>
+        <p:nvPicPr>
+          <p:cNvPr id="2" name="Picture 1"/>
+          <p:cNvPicPr>
+            <a:picLocks noChangeAspect="1"/>
+          </p:cNvPicPr>
+          <p:nvPr/>
+        </p:nvPicPr>
+        <p:blipFill rotWithShape="1">
+          <a:blip r:embed="rId2"/>
+          <a:srcRect l="7076" t="3931" b="3353"/>
+          <a:stretch/>
+        </p:blipFill>
+        <p:spPr>
+          <a:xfrm>
+            <a:off x="914399" y="1056068"/>
+            <a:ext cx="3717433" cy="3090929"/>
+          </a:xfrm>
+          <a:prstGeom prst="rect">
+            <a:avLst/>
+          </a:prstGeom>
+        </p:spPr>
+      </p:pic>
+    </p:spTree>
+    <p:extLst>
+      <p:ext uri="{BB962C8B-B14F-4D97-AF65-F5344CB8AC3E}">
+        <p14:creationId xmlns:p14="http://schemas.microsoft.com/office/powerpoint/2010/main" val="1008883530"/>
       </p:ext>
     </p:extLst>
   </p:cSld>

</xml_diff>